<commit_message>
finished pre-data analysis pipeline, finalized MTurk paradigm
</commit_message>
<xml_diff>
--- a/materials/5_FYP_storybook_structural_control_girlsGreen.pptx
+++ b/materials/5_FYP_storybook_structural_control_girlsGreen.pptx
@@ -224,7 +224,7 @@
           <a:p>
             <a:fld id="{C20298E2-FE9A-409F-B00F-0D4EA8F2524F}" type="datetimeFigureOut">
               <a:rPr lang="en-US" smtClean="0"/>
-              <a:t>3/16/2019</a:t>
+              <a:t>4/20/2019</a:t>
             </a:fld>
             <a:endParaRPr lang="en-US" dirty="0"/>
           </a:p>
@@ -4135,7 +4135,7 @@
           <a:p>
             <a:fld id="{88180E31-E34E-4BE1-9902-AF8A764DB06C}" type="datetimeFigureOut">
               <a:rPr lang="en-US" smtClean="0"/>
-              <a:t>3/16/2019</a:t>
+              <a:t>4/20/2019</a:t>
             </a:fld>
             <a:endParaRPr lang="en-US" dirty="0"/>
           </a:p>
@@ -4303,7 +4303,7 @@
           <a:p>
             <a:fld id="{88180E31-E34E-4BE1-9902-AF8A764DB06C}" type="datetimeFigureOut">
               <a:rPr lang="en-US" smtClean="0"/>
-              <a:t>3/16/2019</a:t>
+              <a:t>4/20/2019</a:t>
             </a:fld>
             <a:endParaRPr lang="en-US" dirty="0"/>
           </a:p>
@@ -4481,7 +4481,7 @@
           <a:p>
             <a:fld id="{88180E31-E34E-4BE1-9902-AF8A764DB06C}" type="datetimeFigureOut">
               <a:rPr lang="en-US" smtClean="0"/>
-              <a:t>3/16/2019</a:t>
+              <a:t>4/20/2019</a:t>
             </a:fld>
             <a:endParaRPr lang="en-US" dirty="0"/>
           </a:p>
@@ -4649,7 +4649,7 @@
           <a:p>
             <a:fld id="{88180E31-E34E-4BE1-9902-AF8A764DB06C}" type="datetimeFigureOut">
               <a:rPr lang="en-US" smtClean="0"/>
-              <a:t>3/16/2019</a:t>
+              <a:t>4/20/2019</a:t>
             </a:fld>
             <a:endParaRPr lang="en-US" dirty="0"/>
           </a:p>
@@ -4894,7 +4894,7 @@
           <a:p>
             <a:fld id="{88180E31-E34E-4BE1-9902-AF8A764DB06C}" type="datetimeFigureOut">
               <a:rPr lang="en-US" smtClean="0"/>
-              <a:t>3/16/2019</a:t>
+              <a:t>4/20/2019</a:t>
             </a:fld>
             <a:endParaRPr lang="en-US" dirty="0"/>
           </a:p>
@@ -5123,7 +5123,7 @@
           <a:p>
             <a:fld id="{88180E31-E34E-4BE1-9902-AF8A764DB06C}" type="datetimeFigureOut">
               <a:rPr lang="en-US" smtClean="0"/>
-              <a:t>3/16/2019</a:t>
+              <a:t>4/20/2019</a:t>
             </a:fld>
             <a:endParaRPr lang="en-US" dirty="0"/>
           </a:p>
@@ -5487,7 +5487,7 @@
           <a:p>
             <a:fld id="{88180E31-E34E-4BE1-9902-AF8A764DB06C}" type="datetimeFigureOut">
               <a:rPr lang="en-US" smtClean="0"/>
-              <a:t>3/16/2019</a:t>
+              <a:t>4/20/2019</a:t>
             </a:fld>
             <a:endParaRPr lang="en-US" dirty="0"/>
           </a:p>
@@ -5604,7 +5604,7 @@
           <a:p>
             <a:fld id="{88180E31-E34E-4BE1-9902-AF8A764DB06C}" type="datetimeFigureOut">
               <a:rPr lang="en-US" smtClean="0"/>
-              <a:t>3/16/2019</a:t>
+              <a:t>4/20/2019</a:t>
             </a:fld>
             <a:endParaRPr lang="en-US" dirty="0"/>
           </a:p>
@@ -5699,7 +5699,7 @@
           <a:p>
             <a:fld id="{88180E31-E34E-4BE1-9902-AF8A764DB06C}" type="datetimeFigureOut">
               <a:rPr lang="en-US" smtClean="0"/>
-              <a:t>3/16/2019</a:t>
+              <a:t>4/20/2019</a:t>
             </a:fld>
             <a:endParaRPr lang="en-US" dirty="0"/>
           </a:p>
@@ -5974,7 +5974,7 @@
           <a:p>
             <a:fld id="{88180E31-E34E-4BE1-9902-AF8A764DB06C}" type="datetimeFigureOut">
               <a:rPr lang="en-US" smtClean="0"/>
-              <a:t>3/16/2019</a:t>
+              <a:t>4/20/2019</a:t>
             </a:fld>
             <a:endParaRPr lang="en-US" dirty="0"/>
           </a:p>
@@ -6226,7 +6226,7 @@
           <a:p>
             <a:fld id="{88180E31-E34E-4BE1-9902-AF8A764DB06C}" type="datetimeFigureOut">
               <a:rPr lang="en-US" smtClean="0"/>
-              <a:t>3/16/2019</a:t>
+              <a:t>4/20/2019</a:t>
             </a:fld>
             <a:endParaRPr lang="en-US" dirty="0"/>
           </a:p>
@@ -6437,7 +6437,7 @@
           <a:p>
             <a:fld id="{88180E31-E34E-4BE1-9902-AF8A764DB06C}" type="datetimeFigureOut">
               <a:rPr lang="en-US" smtClean="0"/>
-              <a:t>3/16/2019</a:t>
+              <a:t>4/20/2019</a:t>
             </a:fld>
             <a:endParaRPr lang="en-US" dirty="0"/>
           </a:p>
@@ -6905,8 +6905,8 @@
         </p:nvSpPr>
         <p:spPr>
           <a:xfrm>
-            <a:off x="4826260" y="4084092"/>
-            <a:ext cx="2539477" cy="2123658"/>
+            <a:off x="3555079" y="4084092"/>
+            <a:ext cx="5081840" cy="2123658"/>
           </a:xfrm>
           <a:prstGeom prst="rect">
             <a:avLst/>
@@ -6925,14 +6925,14 @@
                 <a:latin typeface="Helvetica" panose="020B0604020202020204" pitchFamily="34" charset="0"/>
                 <a:cs typeface="Helvetica" panose="020B0604020202020204" pitchFamily="34" charset="0"/>
               </a:rPr>
-              <a:t>5-6 </a:t>
+              <a:t>5-6 year </a:t>
             </a:r>
             <a:r>
               <a:rPr lang="en-US" sz="6600" dirty="0" err="1">
                 <a:latin typeface="Helvetica" panose="020B0604020202020204" pitchFamily="34" charset="0"/>
                 <a:cs typeface="Helvetica" panose="020B0604020202020204" pitchFamily="34" charset="0"/>
               </a:rPr>
-              <a:t>yo</a:t>
+              <a:t>olds</a:t>
             </a:r>
             <a:endParaRPr lang="en-US" sz="6600" dirty="0">
               <a:latin typeface="Helvetica" panose="020B0604020202020204" pitchFamily="34" charset="0"/>

</xml_diff>